<commit_message>
Done the conclusion, final recommendations and reflection as well as the presentation slides
</commit_message>
<xml_diff>
--- a/evals-and-rec/Presentation/Presentation.pptx
+++ b/evals-and-rec/Presentation/Presentation.pptx
@@ -12,6 +12,8 @@
     <p:sldId id="260" r:id="rId6"/>
     <p:sldId id="261" r:id="rId7"/>
     <p:sldId id="262" r:id="rId8"/>
+    <p:sldId id="263" r:id="rId9"/>
+    <p:sldId id="264" r:id="rId10"/>
   </p:sldIdLst>
   <p:sldSz cx="9144000" cy="6858000" type="screen4x3"/>
   <p:notesSz cx="6858000" cy="9144000"/>
@@ -4010,7 +4012,31 @@
           <a:bodyPr/>
           <a:lstStyle/>
           <a:p>
-            <a:endParaRPr lang="en-US"/>
+            <a:r>
+              <a:rPr lang="en-US" dirty="0" smtClean="0"/>
+              <a:t>Easy to add expenses</a:t>
+            </a:r>
+          </a:p>
+          <a:p>
+            <a:r>
+              <a:rPr lang="en-US" dirty="0" smtClean="0"/>
+              <a:t>Easy to view spending</a:t>
+            </a:r>
+          </a:p>
+          <a:p>
+            <a:r>
+              <a:rPr lang="en-US" dirty="0" smtClean="0"/>
+              <a:t>More in depth data</a:t>
+            </a:r>
+          </a:p>
+          <a:p>
+            <a:r>
+              <a:rPr lang="en-US" dirty="0" smtClean="0"/>
+              <a:t>More customizable</a:t>
+            </a:r>
+          </a:p>
+          <a:p>
+            <a:endParaRPr lang="en-US" dirty="0" smtClean="0"/>
           </a:p>
         </p:txBody>
       </p:sp>
@@ -4018,6 +4044,147 @@
     <p:extLst>
       <p:ext uri="{BB962C8B-B14F-4D97-AF65-F5344CB8AC3E}">
         <p14:creationId xmlns:p14="http://schemas.microsoft.com/office/powerpoint/2010/main" val="175615589"/>
+      </p:ext>
+    </p:extLst>
+  </p:cSld>
+  <p:clrMapOvr>
+    <a:masterClrMapping/>
+  </p:clrMapOvr>
+</p:sld>
+</file>
+
+<file path=ppt/slides/slide8.xml><?xml version="1.0" encoding="utf-8"?>
+<p:sld xmlns:a="http://schemas.openxmlformats.org/drawingml/2006/main" xmlns:r="http://schemas.openxmlformats.org/officeDocument/2006/relationships" xmlns:p="http://schemas.openxmlformats.org/presentationml/2006/main">
+  <p:cSld>
+    <p:spTree>
+      <p:nvGrpSpPr>
+        <p:cNvPr id="1" name=""/>
+        <p:cNvGrpSpPr/>
+        <p:nvPr/>
+      </p:nvGrpSpPr>
+      <p:grpSpPr>
+        <a:xfrm>
+          <a:off x="0" y="0"/>
+          <a:ext cx="0" cy="0"/>
+          <a:chOff x="0" y="0"/>
+          <a:chExt cx="0" cy="0"/>
+        </a:xfrm>
+      </p:grpSpPr>
+      <p:sp>
+        <p:nvSpPr>
+          <p:cNvPr id="2" name="Title 1"/>
+          <p:cNvSpPr>
+            <a:spLocks noGrp="1"/>
+          </p:cNvSpPr>
+          <p:nvPr>
+            <p:ph type="title"/>
+          </p:nvPr>
+        </p:nvSpPr>
+        <p:spPr/>
+        <p:txBody>
+          <a:bodyPr/>
+          <a:lstStyle/>
+          <a:p>
+            <a:r>
+              <a:rPr lang="en-US" dirty="0" smtClean="0"/>
+              <a:t>Final recommendations</a:t>
+            </a:r>
+            <a:endParaRPr lang="en-US" dirty="0"/>
+          </a:p>
+        </p:txBody>
+      </p:sp>
+      <p:sp>
+        <p:nvSpPr>
+          <p:cNvPr id="3" name="Content Placeholder 2"/>
+          <p:cNvSpPr>
+            <a:spLocks noGrp="1"/>
+          </p:cNvSpPr>
+          <p:nvPr>
+            <p:ph idx="1"/>
+          </p:nvPr>
+        </p:nvSpPr>
+        <p:spPr/>
+        <p:txBody>
+          <a:bodyPr/>
+          <a:lstStyle/>
+          <a:p>
+            <a:r>
+              <a:rPr lang="en-US" dirty="0" smtClean="0"/>
+              <a:t>Valid approach with some minor tweaks</a:t>
+            </a:r>
+          </a:p>
+          <a:p>
+            <a:pPr marL="0" indent="0">
+              <a:buNone/>
+            </a:pPr>
+            <a:endParaRPr lang="en-US" dirty="0"/>
+          </a:p>
+        </p:txBody>
+      </p:sp>
+    </p:spTree>
+    <p:extLst>
+      <p:ext uri="{BB962C8B-B14F-4D97-AF65-F5344CB8AC3E}">
+        <p14:creationId xmlns:p14="http://schemas.microsoft.com/office/powerpoint/2010/main" val="463754024"/>
+      </p:ext>
+    </p:extLst>
+  </p:cSld>
+  <p:clrMapOvr>
+    <a:masterClrMapping/>
+  </p:clrMapOvr>
+</p:sld>
+</file>
+
+<file path=ppt/slides/slide9.xml><?xml version="1.0" encoding="utf-8"?>
+<p:sld xmlns:a="http://schemas.openxmlformats.org/drawingml/2006/main" xmlns:r="http://schemas.openxmlformats.org/officeDocument/2006/relationships" xmlns:p="http://schemas.openxmlformats.org/presentationml/2006/main">
+  <p:cSld>
+    <p:spTree>
+      <p:nvGrpSpPr>
+        <p:cNvPr id="1" name=""/>
+        <p:cNvGrpSpPr/>
+        <p:nvPr/>
+      </p:nvGrpSpPr>
+      <p:grpSpPr>
+        <a:xfrm>
+          <a:off x="0" y="0"/>
+          <a:ext cx="0" cy="0"/>
+          <a:chOff x="0" y="0"/>
+          <a:chExt cx="0" cy="0"/>
+        </a:xfrm>
+      </p:grpSpPr>
+      <p:sp>
+        <p:nvSpPr>
+          <p:cNvPr id="2" name="TextBox 1"/>
+          <p:cNvSpPr txBox="1"/>
+          <p:nvPr/>
+        </p:nvSpPr>
+        <p:spPr>
+          <a:xfrm>
+            <a:off x="3439748" y="2976706"/>
+            <a:ext cx="2264504" cy="584776"/>
+          </a:xfrm>
+          <a:prstGeom prst="rect">
+            <a:avLst/>
+          </a:prstGeom>
+          <a:noFill/>
+        </p:spPr>
+        <p:txBody>
+          <a:bodyPr wrap="square" rtlCol="0">
+            <a:spAutoFit/>
+          </a:bodyPr>
+          <a:lstStyle/>
+          <a:p>
+            <a:r>
+              <a:rPr lang="en-US" sz="3200" dirty="0" smtClean="0"/>
+              <a:t>Questions?</a:t>
+            </a:r>
+            <a:endParaRPr lang="en-US" sz="3200" dirty="0"/>
+          </a:p>
+        </p:txBody>
+      </p:sp>
+    </p:spTree>
+    <p:extLst>
+      <p:ext uri="{BB962C8B-B14F-4D97-AF65-F5344CB8AC3E}">
+        <p14:creationId xmlns:p14="http://schemas.microsoft.com/office/powerpoint/2010/main" val="3349580380"/>
       </p:ext>
     </p:extLst>
   </p:cSld>

</xml_diff>